<commit_message>
update w28 report MIR type & papaer
</commit_message>
<xml_diff>
--- a/report/AILAB_W28.pptx
+++ b/report/AILAB_W28.pptx
@@ -10,10 +10,10 @@
     <p:sldMasterId id="2147483930" r:id="rId6"/>
   </p:sldMasterIdLst>
   <p:notesMasterIdLst>
-    <p:notesMasterId r:id="rId15"/>
+    <p:notesMasterId r:id="rId20"/>
   </p:notesMasterIdLst>
   <p:handoutMasterIdLst>
-    <p:handoutMasterId r:id="rId16"/>
+    <p:handoutMasterId r:id="rId21"/>
   </p:handoutMasterIdLst>
   <p:sldIdLst>
     <p:sldId id="426" r:id="rId7"/>
@@ -23,7 +23,12 @@
     <p:sldId id="423" r:id="rId11"/>
     <p:sldId id="424" r:id="rId12"/>
     <p:sldId id="425" r:id="rId13"/>
-    <p:sldId id="421" r:id="rId14"/>
+    <p:sldId id="430" r:id="rId14"/>
+    <p:sldId id="421" r:id="rId15"/>
+    <p:sldId id="429" r:id="rId16"/>
+    <p:sldId id="428" r:id="rId17"/>
+    <p:sldId id="432" r:id="rId18"/>
+    <p:sldId id="431" r:id="rId19"/>
   </p:sldIdLst>
   <p:sldSz cx="9144000" cy="6858000" type="screen4x3"/>
   <p:notesSz cx="7099300" cy="10234613"/>
@@ -18583,6 +18588,632 @@
 </p:sld>
 </file>
 
+<file path=ppt/slides/slide10.xml><?xml version="1.0" encoding="utf-8"?>
+<p:sld xmlns:a="http://schemas.openxmlformats.org/drawingml/2006/main" xmlns:r="http://schemas.openxmlformats.org/officeDocument/2006/relationships" xmlns:p="http://schemas.openxmlformats.org/presentationml/2006/main">
+  <p:cSld>
+    <p:spTree>
+      <p:nvGrpSpPr>
+        <p:cNvPr id="1" name=""/>
+        <p:cNvGrpSpPr/>
+        <p:nvPr/>
+      </p:nvGrpSpPr>
+      <p:grpSpPr>
+        <a:xfrm>
+          <a:off x="0" y="0"/>
+          <a:ext cx="0" cy="0"/>
+          <a:chOff x="0" y="0"/>
+          <a:chExt cx="0" cy="0"/>
+        </a:xfrm>
+      </p:grpSpPr>
+      <p:sp>
+        <p:nvSpPr>
+          <p:cNvPr id="2" name="標題 1"/>
+          <p:cNvSpPr>
+            <a:spLocks noGrp="1"/>
+          </p:cNvSpPr>
+          <p:nvPr>
+            <p:ph type="title"/>
+          </p:nvPr>
+        </p:nvSpPr>
+        <p:spPr/>
+        <p:txBody>
+          <a:bodyPr/>
+          <a:lstStyle/>
+          <a:p>
+            <a:r>
+              <a:rPr lang="en-US" altLang="zh-TW" dirty="0" smtClean="0"/>
+              <a:t>MIREX 2016 - MCK dataset</a:t>
+            </a:r>
+            <a:endParaRPr lang="zh-TW" altLang="en-US" dirty="0"/>
+          </a:p>
+        </p:txBody>
+      </p:sp>
+      <p:sp>
+        <p:nvSpPr>
+          <p:cNvPr id="4" name="頁尾版面配置區 3"/>
+          <p:cNvSpPr>
+            <a:spLocks noGrp="1"/>
+          </p:cNvSpPr>
+          <p:nvPr>
+            <p:ph type="ftr" sz="quarter" idx="10"/>
+          </p:nvPr>
+        </p:nvSpPr>
+        <p:spPr/>
+        <p:txBody>
+          <a:bodyPr/>
+          <a:lstStyle/>
+          <a:p>
+            <a:pPr>
+              <a:defRPr/>
+            </a:pPr>
+            <a:endParaRPr lang="en-US" altLang="zh-TW"/>
+          </a:p>
+        </p:txBody>
+      </p:sp>
+      <p:pic>
+        <p:nvPicPr>
+          <p:cNvPr id="1027" name="Picture 3"/>
+          <p:cNvPicPr>
+            <a:picLocks noChangeAspect="1" noChangeArrowheads="1"/>
+          </p:cNvPicPr>
+          <p:nvPr/>
+        </p:nvPicPr>
+        <p:blipFill>
+          <a:blip r:embed="rId2">
+            <a:extLst>
+              <a:ext uri="{28A0092B-C50C-407E-A947-70E740481C1C}">
+                <a14:useLocalDpi xmlns:a14="http://schemas.microsoft.com/office/drawing/2010/main" val="0"/>
+              </a:ext>
+            </a:extLst>
+          </a:blip>
+          <a:srcRect/>
+          <a:stretch>
+            <a:fillRect/>
+          </a:stretch>
+        </p:blipFill>
+        <p:spPr bwMode="auto">
+          <a:xfrm>
+            <a:off x="152400" y="3222415"/>
+            <a:ext cx="8535278" cy="3715232"/>
+          </a:xfrm>
+          <a:prstGeom prst="rect">
+            <a:avLst/>
+          </a:prstGeom>
+          <a:noFill/>
+          <a:ln>
+            <a:noFill/>
+          </a:ln>
+          <a:effectLst/>
+          <a:extLst>
+            <a:ext uri="{909E8E84-426E-40DD-AFC4-6F175D3DCCD1}">
+              <a14:hiddenFill xmlns:a14="http://schemas.microsoft.com/office/drawing/2010/main">
+                <a:solidFill>
+                  <a:schemeClr val="accent1"/>
+                </a:solidFill>
+              </a14:hiddenFill>
+            </a:ext>
+            <a:ext uri="{91240B29-F687-4F45-9708-019B960494DF}">
+              <a14:hiddenLine xmlns:a14="http://schemas.microsoft.com/office/drawing/2010/main" w="9525">
+                <a:solidFill>
+                  <a:schemeClr val="tx1"/>
+                </a:solidFill>
+                <a:miter lim="800000"/>
+                <a:headEnd/>
+                <a:tailEnd/>
+              </a14:hiddenLine>
+            </a:ext>
+            <a:ext uri="{AF507438-7753-43E0-B8FC-AC1667EBCBE1}">
+              <a14:hiddenEffects xmlns:a14="http://schemas.microsoft.com/office/drawing/2010/main">
+                <a:effectLst>
+                  <a:outerShdw dist="35921" dir="2700000" algn="ctr" rotWithShape="0">
+                    <a:schemeClr val="bg2"/>
+                  </a:outerShdw>
+                </a:effectLst>
+              </a14:hiddenEffects>
+            </a:ext>
+          </a:extLst>
+        </p:spPr>
+      </p:pic>
+      <p:sp>
+        <p:nvSpPr>
+          <p:cNvPr id="11" name="內容版面配置區 2"/>
+          <p:cNvSpPr>
+            <a:spLocks noGrp="1"/>
+          </p:cNvSpPr>
+          <p:nvPr>
+            <p:ph idx="1"/>
+          </p:nvPr>
+        </p:nvSpPr>
+        <p:spPr>
+          <a:xfrm>
+            <a:off x="304800" y="949325"/>
+            <a:ext cx="8610600" cy="607467"/>
+          </a:xfrm>
+        </p:spPr>
+        <p:txBody>
+          <a:bodyPr/>
+          <a:lstStyle/>
+          <a:p>
+            <a:r>
+              <a:rPr lang="en-US" altLang="zh-TW" dirty="0">
+                <a:hlinkClick r:id="rId3"/>
+              </a:rPr>
+              <a:t>http://</a:t>
+            </a:r>
+            <a:r>
+              <a:rPr lang="en-US" altLang="zh-TW" dirty="0" smtClean="0">
+                <a:hlinkClick r:id="rId3"/>
+              </a:rPr>
+              <a:t>www.music-ir.org/mirex/wiki/2016:MIREX2016_Results</a:t>
+            </a:r>
+            <a:endParaRPr lang="en-US" altLang="zh-TW" dirty="0" smtClean="0"/>
+          </a:p>
+          <a:p>
+            <a:r>
+              <a:rPr lang="en-US" altLang="zh-TW" dirty="0"/>
+              <a:t>Evaluation definition: </a:t>
+            </a:r>
+            <a:r>
+              <a:rPr lang="en-US" altLang="zh-TW" dirty="0">
+                <a:hlinkClick r:id="rId4"/>
+              </a:rPr>
+              <a:t>https://www.researchgate.net/publication/268132820_Evaluation_Methods_for_Musical_Audio_Beat_Tracking_Algorithms</a:t>
+            </a:r>
+            <a:endParaRPr lang="en-US" altLang="zh-TW" dirty="0"/>
+          </a:p>
+          <a:p>
+            <a:endParaRPr lang="zh-TW" altLang="en-US" dirty="0"/>
+          </a:p>
+        </p:txBody>
+      </p:sp>
+    </p:spTree>
+    <p:extLst>
+      <p:ext uri="{BB962C8B-B14F-4D97-AF65-F5344CB8AC3E}">
+        <p14:creationId xmlns:p14="http://schemas.microsoft.com/office/powerpoint/2010/main" val="1810900636"/>
+      </p:ext>
+    </p:extLst>
+  </p:cSld>
+  <p:clrMapOvr>
+    <a:masterClrMapping/>
+  </p:clrMapOvr>
+  <p:transition>
+    <p:fade/>
+  </p:transition>
+  <p:timing>
+    <p:tnLst>
+      <p:par>
+        <p:cTn id="1" dur="indefinite" restart="never" nodeType="tmRoot"/>
+      </p:par>
+    </p:tnLst>
+  </p:timing>
+</p:sld>
+</file>
+
+<file path=ppt/slides/slide11.xml><?xml version="1.0" encoding="utf-8"?>
+<p:sld xmlns:a="http://schemas.openxmlformats.org/drawingml/2006/main" xmlns:r="http://schemas.openxmlformats.org/officeDocument/2006/relationships" xmlns:p="http://schemas.openxmlformats.org/presentationml/2006/main">
+  <p:cSld>
+    <p:spTree>
+      <p:nvGrpSpPr>
+        <p:cNvPr id="1" name=""/>
+        <p:cNvGrpSpPr/>
+        <p:nvPr/>
+      </p:nvGrpSpPr>
+      <p:grpSpPr>
+        <a:xfrm>
+          <a:off x="0" y="0"/>
+          <a:ext cx="0" cy="0"/>
+          <a:chOff x="0" y="0"/>
+          <a:chExt cx="0" cy="0"/>
+        </a:xfrm>
+      </p:grpSpPr>
+      <p:sp>
+        <p:nvSpPr>
+          <p:cNvPr id="2" name="標題 1"/>
+          <p:cNvSpPr>
+            <a:spLocks noGrp="1"/>
+          </p:cNvSpPr>
+          <p:nvPr>
+            <p:ph type="title"/>
+          </p:nvPr>
+        </p:nvSpPr>
+        <p:spPr/>
+        <p:txBody>
+          <a:bodyPr/>
+          <a:lstStyle/>
+          <a:p>
+            <a:r>
+              <a:rPr lang="en-US" altLang="zh-TW" dirty="0" smtClean="0"/>
+              <a:t>MIREX 2016 - MAZ dataset</a:t>
+            </a:r>
+            <a:endParaRPr lang="zh-TW" altLang="en-US" dirty="0"/>
+          </a:p>
+        </p:txBody>
+      </p:sp>
+      <p:sp>
+        <p:nvSpPr>
+          <p:cNvPr id="3" name="內容版面配置區 2"/>
+          <p:cNvSpPr>
+            <a:spLocks noGrp="1"/>
+          </p:cNvSpPr>
+          <p:nvPr>
+            <p:ph idx="1"/>
+          </p:nvPr>
+        </p:nvSpPr>
+        <p:spPr>
+          <a:xfrm>
+            <a:off x="304800" y="949325"/>
+            <a:ext cx="8610600" cy="607467"/>
+          </a:xfrm>
+        </p:spPr>
+        <p:txBody>
+          <a:bodyPr/>
+          <a:lstStyle/>
+          <a:p>
+            <a:r>
+              <a:rPr lang="en-US" altLang="zh-TW" dirty="0">
+                <a:hlinkClick r:id="rId2"/>
+              </a:rPr>
+              <a:t>http://</a:t>
+            </a:r>
+            <a:r>
+              <a:rPr lang="en-US" altLang="zh-TW" dirty="0" smtClean="0">
+                <a:hlinkClick r:id="rId2"/>
+              </a:rPr>
+              <a:t>www.music-ir.org/mirex/wiki/2016:MIREX2016_Results</a:t>
+            </a:r>
+            <a:endParaRPr lang="en-US" altLang="zh-TW" dirty="0" smtClean="0"/>
+          </a:p>
+          <a:p>
+            <a:endParaRPr lang="zh-TW" altLang="en-US" dirty="0"/>
+          </a:p>
+        </p:txBody>
+      </p:sp>
+      <p:sp>
+        <p:nvSpPr>
+          <p:cNvPr id="4" name="頁尾版面配置區 3"/>
+          <p:cNvSpPr>
+            <a:spLocks noGrp="1"/>
+          </p:cNvSpPr>
+          <p:nvPr>
+            <p:ph type="ftr" sz="quarter" idx="10"/>
+          </p:nvPr>
+        </p:nvSpPr>
+        <p:spPr/>
+        <p:txBody>
+          <a:bodyPr/>
+          <a:lstStyle/>
+          <a:p>
+            <a:pPr>
+              <a:defRPr/>
+            </a:pPr>
+            <a:endParaRPr lang="en-US" altLang="zh-TW"/>
+          </a:p>
+        </p:txBody>
+      </p:sp>
+      <p:pic>
+        <p:nvPicPr>
+          <p:cNvPr id="2050" name="Picture 2"/>
+          <p:cNvPicPr>
+            <a:picLocks noChangeAspect="1" noChangeArrowheads="1"/>
+          </p:cNvPicPr>
+          <p:nvPr/>
+        </p:nvPicPr>
+        <p:blipFill>
+          <a:blip r:embed="rId3">
+            <a:extLst>
+              <a:ext uri="{28A0092B-C50C-407E-A947-70E740481C1C}">
+                <a14:useLocalDpi xmlns:a14="http://schemas.microsoft.com/office/drawing/2010/main" val="0"/>
+              </a:ext>
+            </a:extLst>
+          </a:blip>
+          <a:srcRect/>
+          <a:stretch>
+            <a:fillRect/>
+          </a:stretch>
+        </p:blipFill>
+        <p:spPr bwMode="auto">
+          <a:xfrm>
+            <a:off x="304800" y="3342280"/>
+            <a:ext cx="8041019" cy="3499332"/>
+          </a:xfrm>
+          <a:prstGeom prst="rect">
+            <a:avLst/>
+          </a:prstGeom>
+          <a:noFill/>
+          <a:ln>
+            <a:noFill/>
+          </a:ln>
+          <a:effectLst/>
+          <a:extLst>
+            <a:ext uri="{909E8E84-426E-40DD-AFC4-6F175D3DCCD1}">
+              <a14:hiddenFill xmlns:a14="http://schemas.microsoft.com/office/drawing/2010/main">
+                <a:solidFill>
+                  <a:schemeClr val="accent1"/>
+                </a:solidFill>
+              </a14:hiddenFill>
+            </a:ext>
+            <a:ext uri="{91240B29-F687-4F45-9708-019B960494DF}">
+              <a14:hiddenLine xmlns:a14="http://schemas.microsoft.com/office/drawing/2010/main" w="9525">
+                <a:solidFill>
+                  <a:schemeClr val="tx1"/>
+                </a:solidFill>
+                <a:miter lim="800000"/>
+                <a:headEnd/>
+                <a:tailEnd/>
+              </a14:hiddenLine>
+            </a:ext>
+            <a:ext uri="{AF507438-7753-43E0-B8FC-AC1667EBCBE1}">
+              <a14:hiddenEffects xmlns:a14="http://schemas.microsoft.com/office/drawing/2010/main">
+                <a:effectLst>
+                  <a:outerShdw dist="35921" dir="2700000" algn="ctr" rotWithShape="0">
+                    <a:schemeClr val="bg2"/>
+                  </a:outerShdw>
+                </a:effectLst>
+              </a14:hiddenEffects>
+            </a:ext>
+          </a:extLst>
+        </p:spPr>
+      </p:pic>
+    </p:spTree>
+    <p:extLst>
+      <p:ext uri="{BB962C8B-B14F-4D97-AF65-F5344CB8AC3E}">
+        <p14:creationId xmlns:p14="http://schemas.microsoft.com/office/powerpoint/2010/main" val="261486961"/>
+      </p:ext>
+    </p:extLst>
+  </p:cSld>
+  <p:clrMapOvr>
+    <a:masterClrMapping/>
+  </p:clrMapOvr>
+  <p:transition>
+    <p:fade/>
+  </p:transition>
+</p:sld>
+</file>
+
+<file path=ppt/slides/slide12.xml><?xml version="1.0" encoding="utf-8"?>
+<p:sld xmlns:a="http://schemas.openxmlformats.org/drawingml/2006/main" xmlns:r="http://schemas.openxmlformats.org/officeDocument/2006/relationships" xmlns:p="http://schemas.openxmlformats.org/presentationml/2006/main">
+  <p:cSld>
+    <p:spTree>
+      <p:nvGrpSpPr>
+        <p:cNvPr id="1" name=""/>
+        <p:cNvGrpSpPr/>
+        <p:nvPr/>
+      </p:nvGrpSpPr>
+      <p:grpSpPr>
+        <a:xfrm>
+          <a:off x="0" y="0"/>
+          <a:ext cx="0" cy="0"/>
+          <a:chOff x="0" y="0"/>
+          <a:chExt cx="0" cy="0"/>
+        </a:xfrm>
+      </p:grpSpPr>
+      <p:sp>
+        <p:nvSpPr>
+          <p:cNvPr id="5" name="標題 4"/>
+          <p:cNvSpPr>
+            <a:spLocks noGrp="1"/>
+          </p:cNvSpPr>
+          <p:nvPr>
+            <p:ph type="ctrTitle"/>
+          </p:nvPr>
+        </p:nvSpPr>
+        <p:spPr/>
+        <p:txBody>
+          <a:bodyPr/>
+          <a:lstStyle/>
+          <a:p>
+            <a:r>
+              <a:rPr lang="en-US" altLang="zh-TW" sz="6600" dirty="0" smtClean="0"/>
+              <a:t>Cover song detection</a:t>
+            </a:r>
+            <a:endParaRPr lang="zh-TW" altLang="en-US" sz="6600" dirty="0"/>
+          </a:p>
+        </p:txBody>
+      </p:sp>
+      <p:sp>
+        <p:nvSpPr>
+          <p:cNvPr id="4" name="頁尾版面配置區 3"/>
+          <p:cNvSpPr>
+            <a:spLocks noGrp="1"/>
+          </p:cNvSpPr>
+          <p:nvPr>
+            <p:ph type="ftr" sz="quarter" idx="10"/>
+          </p:nvPr>
+        </p:nvSpPr>
+        <p:spPr/>
+        <p:txBody>
+          <a:bodyPr/>
+          <a:lstStyle/>
+          <a:p>
+            <a:pPr>
+              <a:defRPr/>
+            </a:pPr>
+            <a:endParaRPr lang="en-US" altLang="zh-TW"/>
+          </a:p>
+        </p:txBody>
+      </p:sp>
+    </p:spTree>
+    <p:extLst>
+      <p:ext uri="{BB962C8B-B14F-4D97-AF65-F5344CB8AC3E}">
+        <p14:creationId xmlns:p14="http://schemas.microsoft.com/office/powerpoint/2010/main" val="4126011410"/>
+      </p:ext>
+    </p:extLst>
+  </p:cSld>
+  <p:clrMapOvr>
+    <a:masterClrMapping/>
+  </p:clrMapOvr>
+  <p:transition>
+    <p:fade/>
+  </p:transition>
+</p:sld>
+</file>
+
+<file path=ppt/slides/slide13.xml><?xml version="1.0" encoding="utf-8"?>
+<p:sld xmlns:a="http://schemas.openxmlformats.org/drawingml/2006/main" xmlns:r="http://schemas.openxmlformats.org/officeDocument/2006/relationships" xmlns:p="http://schemas.openxmlformats.org/presentationml/2006/main">
+  <p:cSld>
+    <p:spTree>
+      <p:nvGrpSpPr>
+        <p:cNvPr id="1" name=""/>
+        <p:cNvGrpSpPr/>
+        <p:nvPr/>
+      </p:nvGrpSpPr>
+      <p:grpSpPr>
+        <a:xfrm>
+          <a:off x="0" y="0"/>
+          <a:ext cx="0" cy="0"/>
+          <a:chOff x="0" y="0"/>
+          <a:chExt cx="0" cy="0"/>
+        </a:xfrm>
+      </p:grpSpPr>
+      <p:sp>
+        <p:nvSpPr>
+          <p:cNvPr id="2" name="標題 1"/>
+          <p:cNvSpPr>
+            <a:spLocks noGrp="1"/>
+          </p:cNvSpPr>
+          <p:nvPr>
+            <p:ph type="title"/>
+          </p:nvPr>
+        </p:nvSpPr>
+        <p:spPr/>
+        <p:txBody>
+          <a:bodyPr/>
+          <a:lstStyle/>
+          <a:p>
+            <a:endParaRPr lang="zh-TW" altLang="en-US"/>
+          </a:p>
+        </p:txBody>
+      </p:sp>
+      <p:sp>
+        <p:nvSpPr>
+          <p:cNvPr id="3" name="內容版面配置區 2"/>
+          <p:cNvSpPr>
+            <a:spLocks noGrp="1"/>
+          </p:cNvSpPr>
+          <p:nvPr>
+            <p:ph idx="1"/>
+          </p:nvPr>
+        </p:nvSpPr>
+        <p:spPr>
+          <a:xfrm>
+            <a:off x="304800" y="764704"/>
+            <a:ext cx="8610600" cy="535459"/>
+          </a:xfrm>
+        </p:spPr>
+        <p:txBody>
+          <a:bodyPr/>
+          <a:lstStyle/>
+          <a:p>
+            <a:r>
+              <a:rPr lang="en-US" altLang="zh-TW" dirty="0"/>
+              <a:t>https://github.com/markostam/coversongs-dual-convnet</a:t>
+            </a:r>
+            <a:endParaRPr lang="zh-TW" altLang="en-US" dirty="0"/>
+          </a:p>
+        </p:txBody>
+      </p:sp>
+      <p:sp>
+        <p:nvSpPr>
+          <p:cNvPr id="4" name="頁尾版面配置區 3"/>
+          <p:cNvSpPr>
+            <a:spLocks noGrp="1"/>
+          </p:cNvSpPr>
+          <p:nvPr>
+            <p:ph type="ftr" sz="quarter" idx="10"/>
+          </p:nvPr>
+        </p:nvSpPr>
+        <p:spPr/>
+        <p:txBody>
+          <a:bodyPr/>
+          <a:lstStyle/>
+          <a:p>
+            <a:pPr>
+              <a:defRPr/>
+            </a:pPr>
+            <a:endParaRPr lang="en-US" altLang="zh-TW"/>
+          </a:p>
+        </p:txBody>
+      </p:sp>
+      <p:pic>
+        <p:nvPicPr>
+          <p:cNvPr id="3074" name="Picture 2"/>
+          <p:cNvPicPr>
+            <a:picLocks noChangeAspect="1" noChangeArrowheads="1"/>
+          </p:cNvPicPr>
+          <p:nvPr/>
+        </p:nvPicPr>
+        <p:blipFill>
+          <a:blip r:embed="rId2">
+            <a:extLst>
+              <a:ext uri="{28A0092B-C50C-407E-A947-70E740481C1C}">
+                <a14:useLocalDpi xmlns:a14="http://schemas.microsoft.com/office/drawing/2010/main" val="0"/>
+              </a:ext>
+            </a:extLst>
+          </a:blip>
+          <a:srcRect/>
+          <a:stretch>
+            <a:fillRect/>
+          </a:stretch>
+        </p:blipFill>
+        <p:spPr bwMode="auto">
+          <a:xfrm>
+            <a:off x="152400" y="1268760"/>
+            <a:ext cx="7371928" cy="5528946"/>
+          </a:xfrm>
+          <a:prstGeom prst="rect">
+            <a:avLst/>
+          </a:prstGeom>
+          <a:noFill/>
+          <a:ln>
+            <a:noFill/>
+          </a:ln>
+          <a:effectLst/>
+          <a:extLst>
+            <a:ext uri="{909E8E84-426E-40DD-AFC4-6F175D3DCCD1}">
+              <a14:hiddenFill xmlns:a14="http://schemas.microsoft.com/office/drawing/2010/main">
+                <a:solidFill>
+                  <a:schemeClr val="accent1"/>
+                </a:solidFill>
+              </a14:hiddenFill>
+            </a:ext>
+            <a:ext uri="{91240B29-F687-4F45-9708-019B960494DF}">
+              <a14:hiddenLine xmlns:a14="http://schemas.microsoft.com/office/drawing/2010/main" w="9525">
+                <a:solidFill>
+                  <a:schemeClr val="tx1"/>
+                </a:solidFill>
+                <a:miter lim="800000"/>
+                <a:headEnd/>
+                <a:tailEnd/>
+              </a14:hiddenLine>
+            </a:ext>
+            <a:ext uri="{AF507438-7753-43E0-B8FC-AC1667EBCBE1}">
+              <a14:hiddenEffects xmlns:a14="http://schemas.microsoft.com/office/drawing/2010/main">
+                <a:effectLst>
+                  <a:outerShdw dist="35921" dir="2700000" algn="ctr" rotWithShape="0">
+                    <a:schemeClr val="bg2"/>
+                  </a:outerShdw>
+                </a:effectLst>
+              </a14:hiddenEffects>
+            </a:ext>
+          </a:extLst>
+        </p:spPr>
+      </p:pic>
+    </p:spTree>
+    <p:extLst>
+      <p:ext uri="{BB962C8B-B14F-4D97-AF65-F5344CB8AC3E}">
+        <p14:creationId xmlns:p14="http://schemas.microsoft.com/office/powerpoint/2010/main" val="3907140845"/>
+      </p:ext>
+    </p:extLst>
+  </p:cSld>
+  <p:clrMapOvr>
+    <a:masterClrMapping/>
+  </p:clrMapOvr>
+  <p:transition>
+    <p:fade/>
+  </p:transition>
+</p:sld>
+</file>
+
 <file path=ppt/slides/slide2.xml><?xml version="1.0" encoding="utf-8"?>
 <p:sld xmlns:a="http://schemas.openxmlformats.org/drawingml/2006/main" xmlns:r="http://schemas.openxmlformats.org/officeDocument/2006/relationships" xmlns:p="http://schemas.openxmlformats.org/presentationml/2006/main">
   <p:cSld>
@@ -18664,8 +19295,8 @@
         </p:blipFill>
         <p:spPr bwMode="auto">
           <a:xfrm>
-            <a:off x="755576" y="969812"/>
-            <a:ext cx="7056784" cy="5303345"/>
+            <a:off x="395536" y="706438"/>
+            <a:ext cx="8172400" cy="6141758"/>
           </a:xfrm>
           <a:prstGeom prst="rect">
             <a:avLst/>
@@ -18695,6 +19326,334 @@
           </a:extLst>
         </p:spPr>
       </p:pic>
+      <p:sp>
+        <p:nvSpPr>
+          <p:cNvPr id="3" name="文字方塊 2"/>
+          <p:cNvSpPr txBox="1"/>
+          <p:nvPr/>
+        </p:nvSpPr>
+        <p:spPr>
+          <a:xfrm>
+            <a:off x="5508104" y="5373216"/>
+            <a:ext cx="2160240" cy="307777"/>
+          </a:xfrm>
+          <a:prstGeom prst="rect">
+            <a:avLst/>
+          </a:prstGeom>
+          <a:noFill/>
+        </p:spPr>
+        <p:txBody>
+          <a:bodyPr wrap="square" rtlCol="0">
+            <a:spAutoFit/>
+          </a:bodyPr>
+          <a:lstStyle/>
+          <a:p>
+            <a:r>
+              <a:rPr lang="en-US" altLang="zh-TW" dirty="0" smtClean="0"/>
+              <a:t>-BLSTM (2011) </a:t>
+            </a:r>
+            <a:endParaRPr lang="zh-TW" altLang="en-US" dirty="0"/>
+          </a:p>
+        </p:txBody>
+      </p:sp>
+      <p:sp>
+        <p:nvSpPr>
+          <p:cNvPr id="6" name="文字方塊 5"/>
+          <p:cNvSpPr txBox="1"/>
+          <p:nvPr/>
+        </p:nvSpPr>
+        <p:spPr>
+          <a:xfrm>
+            <a:off x="899592" y="2924944"/>
+            <a:ext cx="2160240" cy="307777"/>
+          </a:xfrm>
+          <a:prstGeom prst="rect">
+            <a:avLst/>
+          </a:prstGeom>
+          <a:noFill/>
+        </p:spPr>
+        <p:txBody>
+          <a:bodyPr wrap="square" rtlCol="0">
+            <a:spAutoFit/>
+          </a:bodyPr>
+          <a:lstStyle/>
+          <a:p>
+            <a:r>
+              <a:rPr lang="en-US" altLang="zh-TW" dirty="0" smtClean="0"/>
+              <a:t>- parallel CNN</a:t>
+            </a:r>
+            <a:endParaRPr lang="zh-TW" altLang="en-US" dirty="0"/>
+          </a:p>
+        </p:txBody>
+      </p:sp>
+      <p:sp>
+        <p:nvSpPr>
+          <p:cNvPr id="7" name="文字方塊 6"/>
+          <p:cNvSpPr txBox="1"/>
+          <p:nvPr/>
+        </p:nvSpPr>
+        <p:spPr>
+          <a:xfrm>
+            <a:off x="899592" y="3553271"/>
+            <a:ext cx="2160240" cy="307777"/>
+          </a:xfrm>
+          <a:prstGeom prst="rect">
+            <a:avLst/>
+          </a:prstGeom>
+          <a:noFill/>
+        </p:spPr>
+        <p:txBody>
+          <a:bodyPr wrap="square" rtlCol="0">
+            <a:spAutoFit/>
+          </a:bodyPr>
+          <a:lstStyle/>
+          <a:p>
+            <a:r>
+              <a:rPr lang="en-US" altLang="zh-TW" dirty="0" smtClean="0"/>
+              <a:t>- CNN</a:t>
+            </a:r>
+            <a:endParaRPr lang="zh-TW" altLang="en-US" dirty="0"/>
+          </a:p>
+        </p:txBody>
+      </p:sp>
+      <p:sp>
+        <p:nvSpPr>
+          <p:cNvPr id="8" name="文字方塊 7"/>
+          <p:cNvSpPr txBox="1"/>
+          <p:nvPr/>
+        </p:nvSpPr>
+        <p:spPr>
+          <a:xfrm>
+            <a:off x="899592" y="4129335"/>
+            <a:ext cx="2160240" cy="307777"/>
+          </a:xfrm>
+          <a:prstGeom prst="rect">
+            <a:avLst/>
+          </a:prstGeom>
+          <a:noFill/>
+        </p:spPr>
+        <p:txBody>
+          <a:bodyPr wrap="square" rtlCol="0">
+            <a:spAutoFit/>
+          </a:bodyPr>
+          <a:lstStyle/>
+          <a:p>
+            <a:r>
+              <a:rPr lang="en-US" altLang="zh-TW" dirty="0" smtClean="0"/>
+              <a:t>- LSTM</a:t>
+            </a:r>
+            <a:endParaRPr lang="zh-TW" altLang="en-US" dirty="0"/>
+          </a:p>
+        </p:txBody>
+      </p:sp>
+      <p:sp>
+        <p:nvSpPr>
+          <p:cNvPr id="10" name="文字方塊 9"/>
+          <p:cNvSpPr txBox="1"/>
+          <p:nvPr/>
+        </p:nvSpPr>
+        <p:spPr>
+          <a:xfrm>
+            <a:off x="2339752" y="3913311"/>
+            <a:ext cx="2160240" cy="307777"/>
+          </a:xfrm>
+          <a:prstGeom prst="rect">
+            <a:avLst/>
+          </a:prstGeom>
+          <a:noFill/>
+        </p:spPr>
+        <p:txBody>
+          <a:bodyPr wrap="square" rtlCol="0">
+            <a:spAutoFit/>
+          </a:bodyPr>
+          <a:lstStyle/>
+          <a:p>
+            <a:r>
+              <a:rPr lang="en-US" altLang="zh-TW" dirty="0" smtClean="0"/>
+              <a:t>- </a:t>
+            </a:r>
+            <a:r>
+              <a:rPr lang="zh-TW" altLang="en-US" dirty="0" smtClean="0"/>
+              <a:t>採譜</a:t>
+            </a:r>
+            <a:endParaRPr lang="zh-TW" altLang="en-US" dirty="0"/>
+          </a:p>
+        </p:txBody>
+      </p:sp>
+      <p:sp>
+        <p:nvSpPr>
+          <p:cNvPr id="11" name="文字方塊 10"/>
+          <p:cNvSpPr txBox="1"/>
+          <p:nvPr/>
+        </p:nvSpPr>
+        <p:spPr>
+          <a:xfrm>
+            <a:off x="5292080" y="2924944"/>
+            <a:ext cx="2160240" cy="307777"/>
+          </a:xfrm>
+          <a:prstGeom prst="rect">
+            <a:avLst/>
+          </a:prstGeom>
+          <a:noFill/>
+        </p:spPr>
+        <p:txBody>
+          <a:bodyPr wrap="square" rtlCol="0">
+            <a:spAutoFit/>
+          </a:bodyPr>
+          <a:lstStyle/>
+          <a:p>
+            <a:r>
+              <a:rPr lang="en-US" altLang="zh-TW" dirty="0" smtClean="0"/>
+              <a:t>- CNN/DNN/RNN</a:t>
+            </a:r>
+            <a:endParaRPr lang="zh-TW" altLang="en-US" dirty="0"/>
+          </a:p>
+        </p:txBody>
+      </p:sp>
+      <p:sp>
+        <p:nvSpPr>
+          <p:cNvPr id="12" name="文字方塊 11"/>
+          <p:cNvSpPr txBox="1"/>
+          <p:nvPr/>
+        </p:nvSpPr>
+        <p:spPr>
+          <a:xfrm>
+            <a:off x="6876256" y="5137447"/>
+            <a:ext cx="936104" cy="307777"/>
+          </a:xfrm>
+          <a:prstGeom prst="rect">
+            <a:avLst/>
+          </a:prstGeom>
+          <a:noFill/>
+        </p:spPr>
+        <p:txBody>
+          <a:bodyPr wrap="square" rtlCol="0">
+            <a:spAutoFit/>
+          </a:bodyPr>
+          <a:lstStyle/>
+          <a:p>
+            <a:r>
+              <a:rPr lang="en-US" altLang="zh-TW" dirty="0" smtClean="0">
+                <a:solidFill>
+                  <a:srgbClr val="FF0000"/>
+                </a:solidFill>
+              </a:rPr>
+              <a:t>[MIREX]</a:t>
+            </a:r>
+            <a:endParaRPr lang="zh-TW" altLang="en-US" dirty="0">
+              <a:solidFill>
+                <a:srgbClr val="FF0000"/>
+              </a:solidFill>
+            </a:endParaRPr>
+          </a:p>
+        </p:txBody>
+      </p:sp>
+      <p:sp>
+        <p:nvSpPr>
+          <p:cNvPr id="13" name="文字方塊 12"/>
+          <p:cNvSpPr txBox="1"/>
+          <p:nvPr/>
+        </p:nvSpPr>
+        <p:spPr>
+          <a:xfrm>
+            <a:off x="6876256" y="5733256"/>
+            <a:ext cx="936104" cy="307777"/>
+          </a:xfrm>
+          <a:prstGeom prst="rect">
+            <a:avLst/>
+          </a:prstGeom>
+          <a:noFill/>
+        </p:spPr>
+        <p:txBody>
+          <a:bodyPr wrap="square" rtlCol="0">
+            <a:spAutoFit/>
+          </a:bodyPr>
+          <a:lstStyle/>
+          <a:p>
+            <a:r>
+              <a:rPr lang="en-US" altLang="zh-TW" dirty="0" smtClean="0">
+                <a:solidFill>
+                  <a:srgbClr val="FF0000"/>
+                </a:solidFill>
+              </a:rPr>
+              <a:t>[MIREX]</a:t>
+            </a:r>
+            <a:endParaRPr lang="zh-TW" altLang="en-US" dirty="0">
+              <a:solidFill>
+                <a:srgbClr val="FF0000"/>
+              </a:solidFill>
+            </a:endParaRPr>
+          </a:p>
+        </p:txBody>
+      </p:sp>
+      <p:sp>
+        <p:nvSpPr>
+          <p:cNvPr id="14" name="文字方塊 13"/>
+          <p:cNvSpPr txBox="1"/>
+          <p:nvPr/>
+        </p:nvSpPr>
+        <p:spPr>
+          <a:xfrm>
+            <a:off x="7308304" y="3284984"/>
+            <a:ext cx="936104" cy="307777"/>
+          </a:xfrm>
+          <a:prstGeom prst="rect">
+            <a:avLst/>
+          </a:prstGeom>
+          <a:noFill/>
+        </p:spPr>
+        <p:txBody>
+          <a:bodyPr wrap="square" rtlCol="0">
+            <a:spAutoFit/>
+          </a:bodyPr>
+          <a:lstStyle/>
+          <a:p>
+            <a:r>
+              <a:rPr lang="en-US" altLang="zh-TW" dirty="0" smtClean="0">
+                <a:solidFill>
+                  <a:srgbClr val="FF0000"/>
+                </a:solidFill>
+              </a:rPr>
+              <a:t>[MIREX]</a:t>
+            </a:r>
+            <a:endParaRPr lang="zh-TW" altLang="en-US" dirty="0">
+              <a:solidFill>
+                <a:srgbClr val="FF0000"/>
+              </a:solidFill>
+            </a:endParaRPr>
+          </a:p>
+        </p:txBody>
+      </p:sp>
+      <p:sp>
+        <p:nvSpPr>
+          <p:cNvPr id="15" name="文字方塊 14"/>
+          <p:cNvSpPr txBox="1"/>
+          <p:nvPr/>
+        </p:nvSpPr>
+        <p:spPr>
+          <a:xfrm>
+            <a:off x="7992888" y="3284984"/>
+            <a:ext cx="575048" cy="307777"/>
+          </a:xfrm>
+          <a:prstGeom prst="rect">
+            <a:avLst/>
+          </a:prstGeom>
+          <a:noFill/>
+        </p:spPr>
+        <p:txBody>
+          <a:bodyPr wrap="square" rtlCol="0">
+            <a:spAutoFit/>
+          </a:bodyPr>
+          <a:lstStyle/>
+          <a:p>
+            <a:r>
+              <a:rPr lang="zh-TW" altLang="en-US" dirty="0" smtClean="0"/>
+              <a:t>速度</a:t>
+            </a:r>
+            <a:endParaRPr lang="zh-TW" altLang="en-US" dirty="0"/>
+          </a:p>
+        </p:txBody>
+      </p:sp>
     </p:spTree>
     <p:extLst>
       <p:ext uri="{BB962C8B-B14F-4D97-AF65-F5344CB8AC3E}">
@@ -19953,6 +20912,88 @@
 </file>
 
 <file path=ppt/slides/slide8.xml><?xml version="1.0" encoding="utf-8"?>
+<p:sld xmlns:a="http://schemas.openxmlformats.org/drawingml/2006/main" xmlns:r="http://schemas.openxmlformats.org/officeDocument/2006/relationships" xmlns:p="http://schemas.openxmlformats.org/presentationml/2006/main">
+  <p:cSld>
+    <p:spTree>
+      <p:nvGrpSpPr>
+        <p:cNvPr id="1" name=""/>
+        <p:cNvGrpSpPr/>
+        <p:nvPr/>
+      </p:nvGrpSpPr>
+      <p:grpSpPr>
+        <a:xfrm>
+          <a:off x="0" y="0"/>
+          <a:ext cx="0" cy="0"/>
+          <a:chOff x="0" y="0"/>
+          <a:chExt cx="0" cy="0"/>
+        </a:xfrm>
+      </p:grpSpPr>
+      <p:sp>
+        <p:nvSpPr>
+          <p:cNvPr id="5" name="標題 4"/>
+          <p:cNvSpPr>
+            <a:spLocks noGrp="1"/>
+          </p:cNvSpPr>
+          <p:nvPr>
+            <p:ph type="ctrTitle"/>
+          </p:nvPr>
+        </p:nvSpPr>
+        <p:spPr/>
+        <p:txBody>
+          <a:bodyPr/>
+          <a:lstStyle/>
+          <a:p>
+            <a:r>
+              <a:rPr lang="en-US" altLang="zh-TW" sz="6600" dirty="0"/>
+              <a:t>Beat Tracking </a:t>
+            </a:r>
+            <a:r>
+              <a:rPr lang="en-US" altLang="zh-TW" sz="6600" dirty="0" smtClean="0"/>
+              <a:t>dataset</a:t>
+            </a:r>
+            <a:endParaRPr lang="zh-TW" altLang="en-US" sz="6600" dirty="0"/>
+          </a:p>
+        </p:txBody>
+      </p:sp>
+      <p:sp>
+        <p:nvSpPr>
+          <p:cNvPr id="4" name="頁尾版面配置區 3"/>
+          <p:cNvSpPr>
+            <a:spLocks noGrp="1"/>
+          </p:cNvSpPr>
+          <p:nvPr>
+            <p:ph type="ftr" sz="quarter" idx="10"/>
+          </p:nvPr>
+        </p:nvSpPr>
+        <p:spPr/>
+        <p:txBody>
+          <a:bodyPr/>
+          <a:lstStyle/>
+          <a:p>
+            <a:pPr>
+              <a:defRPr/>
+            </a:pPr>
+            <a:endParaRPr lang="en-US" altLang="zh-TW"/>
+          </a:p>
+        </p:txBody>
+      </p:sp>
+    </p:spTree>
+    <p:extLst>
+      <p:ext uri="{BB962C8B-B14F-4D97-AF65-F5344CB8AC3E}">
+        <p14:creationId xmlns:p14="http://schemas.microsoft.com/office/powerpoint/2010/main" val="1542022501"/>
+      </p:ext>
+    </p:extLst>
+  </p:cSld>
+  <p:clrMapOvr>
+    <a:masterClrMapping/>
+  </p:clrMapOvr>
+  <p:transition>
+    <p:fade/>
+  </p:transition>
+</p:sld>
+</file>
+
+<file path=ppt/slides/slide9.xml><?xml version="1.0" encoding="utf-8"?>
 <p:sld xmlns:a="http://schemas.openxmlformats.org/drawingml/2006/main" xmlns:r="http://schemas.openxmlformats.org/officeDocument/2006/relationships" xmlns:p="http://schemas.openxmlformats.org/presentationml/2006/main">
   <p:cSld>
     <p:spTree>

</xml_diff>